<commit_message>
changed figure and text-level tweaks
</commit_message>
<xml_diff>
--- a/fig/figs.pptx
+++ b/fig/figs.pptx
@@ -6,6 +6,8 @@
   </p:sldMasterIdLst>
   <p:sldIdLst>
     <p:sldId id="256" r:id="rId2"/>
+    <p:sldId id="257" r:id="rId3"/>
+    <p:sldId id="258" r:id="rId4"/>
   </p:sldIdLst>
   <p:sldSz cx="12192000" cy="6858000"/>
   <p:notesSz cx="6858000" cy="9144000"/>
@@ -270,7 +272,7 @@
           <a:p>
             <a:fld id="{8CE2ED27-E1E6-584B-9075-E3E1BA3B4D82}" type="datetimeFigureOut">
               <a:rPr lang="en-US" smtClean="0"/>
-              <a:t>4/15/20</a:t>
+              <a:t>4/25/20</a:t>
             </a:fld>
             <a:endParaRPr lang="en-US"/>
           </a:p>
@@ -468,7 +470,7 @@
           <a:p>
             <a:fld id="{8CE2ED27-E1E6-584B-9075-E3E1BA3B4D82}" type="datetimeFigureOut">
               <a:rPr lang="en-US" smtClean="0"/>
-              <a:t>4/15/20</a:t>
+              <a:t>4/25/20</a:t>
             </a:fld>
             <a:endParaRPr lang="en-US"/>
           </a:p>
@@ -676,7 +678,7 @@
           <a:p>
             <a:fld id="{8CE2ED27-E1E6-584B-9075-E3E1BA3B4D82}" type="datetimeFigureOut">
               <a:rPr lang="en-US" smtClean="0"/>
-              <a:t>4/15/20</a:t>
+              <a:t>4/25/20</a:t>
             </a:fld>
             <a:endParaRPr lang="en-US"/>
           </a:p>
@@ -874,7 +876,7 @@
           <a:p>
             <a:fld id="{8CE2ED27-E1E6-584B-9075-E3E1BA3B4D82}" type="datetimeFigureOut">
               <a:rPr lang="en-US" smtClean="0"/>
-              <a:t>4/15/20</a:t>
+              <a:t>4/25/20</a:t>
             </a:fld>
             <a:endParaRPr lang="en-US"/>
           </a:p>
@@ -1149,7 +1151,7 @@
           <a:p>
             <a:fld id="{8CE2ED27-E1E6-584B-9075-E3E1BA3B4D82}" type="datetimeFigureOut">
               <a:rPr lang="en-US" smtClean="0"/>
-              <a:t>4/15/20</a:t>
+              <a:t>4/25/20</a:t>
             </a:fld>
             <a:endParaRPr lang="en-US"/>
           </a:p>
@@ -1414,7 +1416,7 @@
           <a:p>
             <a:fld id="{8CE2ED27-E1E6-584B-9075-E3E1BA3B4D82}" type="datetimeFigureOut">
               <a:rPr lang="en-US" smtClean="0"/>
-              <a:t>4/15/20</a:t>
+              <a:t>4/25/20</a:t>
             </a:fld>
             <a:endParaRPr lang="en-US"/>
           </a:p>
@@ -1826,7 +1828,7 @@
           <a:p>
             <a:fld id="{8CE2ED27-E1E6-584B-9075-E3E1BA3B4D82}" type="datetimeFigureOut">
               <a:rPr lang="en-US" smtClean="0"/>
-              <a:t>4/15/20</a:t>
+              <a:t>4/25/20</a:t>
             </a:fld>
             <a:endParaRPr lang="en-US"/>
           </a:p>
@@ -1967,7 +1969,7 @@
           <a:p>
             <a:fld id="{8CE2ED27-E1E6-584B-9075-E3E1BA3B4D82}" type="datetimeFigureOut">
               <a:rPr lang="en-US" smtClean="0"/>
-              <a:t>4/15/20</a:t>
+              <a:t>4/25/20</a:t>
             </a:fld>
             <a:endParaRPr lang="en-US"/>
           </a:p>
@@ -2080,7 +2082,7 @@
           <a:p>
             <a:fld id="{8CE2ED27-E1E6-584B-9075-E3E1BA3B4D82}" type="datetimeFigureOut">
               <a:rPr lang="en-US" smtClean="0"/>
-              <a:t>4/15/20</a:t>
+              <a:t>4/25/20</a:t>
             </a:fld>
             <a:endParaRPr lang="en-US"/>
           </a:p>
@@ -2391,7 +2393,7 @@
           <a:p>
             <a:fld id="{8CE2ED27-E1E6-584B-9075-E3E1BA3B4D82}" type="datetimeFigureOut">
               <a:rPr lang="en-US" smtClean="0"/>
-              <a:t>4/15/20</a:t>
+              <a:t>4/25/20</a:t>
             </a:fld>
             <a:endParaRPr lang="en-US"/>
           </a:p>
@@ -2679,7 +2681,7 @@
           <a:p>
             <a:fld id="{8CE2ED27-E1E6-584B-9075-E3E1BA3B4D82}" type="datetimeFigureOut">
               <a:rPr lang="en-US" smtClean="0"/>
-              <a:t>4/15/20</a:t>
+              <a:t>4/25/20</a:t>
             </a:fld>
             <a:endParaRPr lang="en-US"/>
           </a:p>
@@ -2920,7 +2922,7 @@
           <a:p>
             <a:fld id="{8CE2ED27-E1E6-584B-9075-E3E1BA3B4D82}" type="datetimeFigureOut">
               <a:rPr lang="en-US" smtClean="0"/>
-              <a:t>4/15/20</a:t>
+              <a:t>4/25/20</a:t>
             </a:fld>
             <a:endParaRPr lang="en-US"/>
           </a:p>
@@ -3400,6 +3402,674 @@
 </p:sld>
 </file>
 
+<file path=ppt/slides/slide2.xml><?xml version="1.0" encoding="utf-8"?>
+<p:sld xmlns:a="http://schemas.openxmlformats.org/drawingml/2006/main" xmlns:r="http://schemas.openxmlformats.org/officeDocument/2006/relationships" xmlns:p="http://schemas.openxmlformats.org/presentationml/2006/main">
+  <p:cSld>
+    <p:spTree>
+      <p:nvGrpSpPr>
+        <p:cNvPr id="1" name=""/>
+        <p:cNvGrpSpPr/>
+        <p:nvPr/>
+      </p:nvGrpSpPr>
+      <p:grpSpPr>
+        <a:xfrm>
+          <a:off x="0" y="0"/>
+          <a:ext cx="0" cy="0"/>
+          <a:chOff x="0" y="0"/>
+          <a:chExt cx="0" cy="0"/>
+        </a:xfrm>
+      </p:grpSpPr>
+      <p:grpSp>
+        <p:nvGrpSpPr>
+          <p:cNvPr id="6" name="Group 5">
+            <a:extLst>
+              <a:ext uri="{FF2B5EF4-FFF2-40B4-BE49-F238E27FC236}">
+                <a16:creationId xmlns:a16="http://schemas.microsoft.com/office/drawing/2014/main" id="{1F3AE8FF-770F-3D47-8DCA-720706B8D028}"/>
+              </a:ext>
+            </a:extLst>
+          </p:cNvPr>
+          <p:cNvGrpSpPr/>
+          <p:nvPr/>
+        </p:nvGrpSpPr>
+        <p:grpSpPr>
+          <a:xfrm>
+            <a:off x="780198" y="1538271"/>
+            <a:ext cx="10869258" cy="3504459"/>
+            <a:chOff x="780198" y="1538271"/>
+            <a:chExt cx="10869258" cy="3504459"/>
+          </a:xfrm>
+        </p:grpSpPr>
+        <p:pic>
+          <p:nvPicPr>
+            <p:cNvPr id="2" name="Picture 1">
+              <a:extLst>
+                <a:ext uri="{FF2B5EF4-FFF2-40B4-BE49-F238E27FC236}">
+                  <a16:creationId xmlns:a16="http://schemas.microsoft.com/office/drawing/2014/main" id="{14FFF2B0-BB4F-A344-89A8-B36E75F94DA2}"/>
+                </a:ext>
+              </a:extLst>
+            </p:cNvPr>
+            <p:cNvPicPr>
+              <a:picLocks noChangeAspect="1"/>
+            </p:cNvPicPr>
+            <p:nvPr/>
+          </p:nvPicPr>
+          <p:blipFill>
+            <a:blip r:embed="rId2"/>
+            <a:stretch>
+              <a:fillRect/>
+            </a:stretch>
+          </p:blipFill>
+          <p:spPr>
+            <a:xfrm>
+              <a:off x="1214932" y="1815270"/>
+              <a:ext cx="4881068" cy="3227460"/>
+            </a:xfrm>
+            <a:prstGeom prst="rect">
+              <a:avLst/>
+            </a:prstGeom>
+          </p:spPr>
+        </p:pic>
+        <p:pic>
+          <p:nvPicPr>
+            <p:cNvPr id="3" name="Picture 2">
+              <a:extLst>
+                <a:ext uri="{FF2B5EF4-FFF2-40B4-BE49-F238E27FC236}">
+                  <a16:creationId xmlns:a16="http://schemas.microsoft.com/office/drawing/2014/main" id="{A6035395-6430-8F4F-AA78-ECE6B93A38A4}"/>
+                </a:ext>
+              </a:extLst>
+            </p:cNvPr>
+            <p:cNvPicPr>
+              <a:picLocks noChangeAspect="1"/>
+            </p:cNvPicPr>
+            <p:nvPr/>
+          </p:nvPicPr>
+          <p:blipFill>
+            <a:blip r:embed="rId3"/>
+            <a:stretch>
+              <a:fillRect/>
+            </a:stretch>
+          </p:blipFill>
+          <p:spPr>
+            <a:xfrm>
+              <a:off x="6768388" y="1815270"/>
+              <a:ext cx="4881068" cy="3227460"/>
+            </a:xfrm>
+            <a:prstGeom prst="rect">
+              <a:avLst/>
+            </a:prstGeom>
+          </p:spPr>
+        </p:pic>
+        <p:sp>
+          <p:nvSpPr>
+            <p:cNvPr id="4" name="TextBox 3">
+              <a:extLst>
+                <a:ext uri="{FF2B5EF4-FFF2-40B4-BE49-F238E27FC236}">
+                  <a16:creationId xmlns:a16="http://schemas.microsoft.com/office/drawing/2014/main" id="{A24FE8E6-70B4-D143-A108-D5CE2396B565}"/>
+                </a:ext>
+              </a:extLst>
+            </p:cNvPr>
+            <p:cNvSpPr txBox="1"/>
+            <p:nvPr/>
+          </p:nvSpPr>
+          <p:spPr>
+            <a:xfrm>
+              <a:off x="780198" y="1538271"/>
+              <a:ext cx="434734" cy="553998"/>
+            </a:xfrm>
+            <a:prstGeom prst="rect">
+              <a:avLst/>
+            </a:prstGeom>
+            <a:noFill/>
+          </p:spPr>
+          <p:txBody>
+            <a:bodyPr wrap="none" rtlCol="0">
+              <a:spAutoFit/>
+            </a:bodyPr>
+            <a:lstStyle/>
+            <a:p>
+              <a:r>
+                <a:rPr lang="en-US" sz="3000" dirty="0">
+                  <a:latin typeface="Yu Gothic" panose="020B0400000000000000" pitchFamily="34" charset="-128"/>
+                  <a:ea typeface="Yu Gothic" panose="020B0400000000000000" pitchFamily="34" charset="-128"/>
+                </a:rPr>
+                <a:t>A</a:t>
+              </a:r>
+            </a:p>
+          </p:txBody>
+        </p:sp>
+        <p:sp>
+          <p:nvSpPr>
+            <p:cNvPr id="5" name="TextBox 4">
+              <a:extLst>
+                <a:ext uri="{FF2B5EF4-FFF2-40B4-BE49-F238E27FC236}">
+                  <a16:creationId xmlns:a16="http://schemas.microsoft.com/office/drawing/2014/main" id="{48EE85A2-867E-C044-B21D-ED43D8FF9378}"/>
+                </a:ext>
+              </a:extLst>
+            </p:cNvPr>
+            <p:cNvSpPr txBox="1"/>
+            <p:nvPr/>
+          </p:nvSpPr>
+          <p:spPr>
+            <a:xfrm>
+              <a:off x="6333654" y="1538271"/>
+              <a:ext cx="445956" cy="553998"/>
+            </a:xfrm>
+            <a:prstGeom prst="rect">
+              <a:avLst/>
+            </a:prstGeom>
+            <a:noFill/>
+          </p:spPr>
+          <p:txBody>
+            <a:bodyPr wrap="none" rtlCol="0">
+              <a:spAutoFit/>
+            </a:bodyPr>
+            <a:lstStyle/>
+            <a:p>
+              <a:r>
+                <a:rPr lang="en-US" sz="3000" dirty="0">
+                  <a:latin typeface="Yu Gothic" panose="020B0400000000000000" pitchFamily="34" charset="-128"/>
+                  <a:ea typeface="Yu Gothic" panose="020B0400000000000000" pitchFamily="34" charset="-128"/>
+                </a:rPr>
+                <a:t>B</a:t>
+              </a:r>
+            </a:p>
+          </p:txBody>
+        </p:sp>
+      </p:grpSp>
+    </p:spTree>
+    <p:extLst>
+      <p:ext uri="{BB962C8B-B14F-4D97-AF65-F5344CB8AC3E}">
+        <p14:creationId xmlns:p14="http://schemas.microsoft.com/office/powerpoint/2010/main" val="444987847"/>
+      </p:ext>
+    </p:extLst>
+  </p:cSld>
+  <p:clrMapOvr>
+    <a:masterClrMapping/>
+  </p:clrMapOvr>
+</p:sld>
+</file>
+
+<file path=ppt/slides/slide3.xml><?xml version="1.0" encoding="utf-8"?>
+<p:sld xmlns:a="http://schemas.openxmlformats.org/drawingml/2006/main" xmlns:r="http://schemas.openxmlformats.org/officeDocument/2006/relationships" xmlns:p="http://schemas.openxmlformats.org/presentationml/2006/main">
+  <p:cSld>
+    <p:spTree>
+      <p:nvGrpSpPr>
+        <p:cNvPr id="1" name=""/>
+        <p:cNvGrpSpPr/>
+        <p:nvPr/>
+      </p:nvGrpSpPr>
+      <p:grpSpPr>
+        <a:xfrm>
+          <a:off x="0" y="0"/>
+          <a:ext cx="0" cy="0"/>
+          <a:chOff x="0" y="0"/>
+          <a:chExt cx="0" cy="0"/>
+        </a:xfrm>
+      </p:grpSpPr>
+      <p:grpSp>
+        <p:nvGrpSpPr>
+          <p:cNvPr id="18" name="Group 17">
+            <a:extLst>
+              <a:ext uri="{FF2B5EF4-FFF2-40B4-BE49-F238E27FC236}">
+                <a16:creationId xmlns:a16="http://schemas.microsoft.com/office/drawing/2014/main" id="{7422252C-7CF9-0F44-B4D9-59F5AEBCE33E}"/>
+              </a:ext>
+            </a:extLst>
+          </p:cNvPr>
+          <p:cNvGrpSpPr/>
+          <p:nvPr/>
+        </p:nvGrpSpPr>
+        <p:grpSpPr>
+          <a:xfrm>
+            <a:off x="2081762" y="1207353"/>
+            <a:ext cx="9934291" cy="4103696"/>
+            <a:chOff x="2081762" y="1207353"/>
+            <a:chExt cx="9934291" cy="4103696"/>
+          </a:xfrm>
+        </p:grpSpPr>
+        <p:pic>
+          <p:nvPicPr>
+            <p:cNvPr id="15" name="Picture 14">
+              <a:extLst>
+                <a:ext uri="{FF2B5EF4-FFF2-40B4-BE49-F238E27FC236}">
+                  <a16:creationId xmlns:a16="http://schemas.microsoft.com/office/drawing/2014/main" id="{F560D8F8-DFE8-AA40-A53D-76026BE99D92}"/>
+                </a:ext>
+              </a:extLst>
+            </p:cNvPr>
+            <p:cNvPicPr>
+              <a:picLocks noChangeAspect="1"/>
+            </p:cNvPicPr>
+            <p:nvPr/>
+          </p:nvPicPr>
+          <p:blipFill>
+            <a:blip r:embed="rId2"/>
+            <a:stretch>
+              <a:fillRect/>
+            </a:stretch>
+          </p:blipFill>
+          <p:spPr>
+            <a:xfrm>
+              <a:off x="7476508" y="1916283"/>
+              <a:ext cx="4539545" cy="3002720"/>
+            </a:xfrm>
+            <a:prstGeom prst="rect">
+              <a:avLst/>
+            </a:prstGeom>
+          </p:spPr>
+        </p:pic>
+        <p:pic>
+          <p:nvPicPr>
+            <p:cNvPr id="16" name="Picture 15">
+              <a:extLst>
+                <a:ext uri="{FF2B5EF4-FFF2-40B4-BE49-F238E27FC236}">
+                  <a16:creationId xmlns:a16="http://schemas.microsoft.com/office/drawing/2014/main" id="{D78DF4D7-D255-EB46-BB00-D364F49164D4}"/>
+                </a:ext>
+              </a:extLst>
+            </p:cNvPr>
+            <p:cNvPicPr>
+              <a:picLocks noChangeAspect="1"/>
+            </p:cNvPicPr>
+            <p:nvPr/>
+          </p:nvPicPr>
+          <p:blipFill>
+            <a:blip r:embed="rId3"/>
+            <a:stretch>
+              <a:fillRect/>
+            </a:stretch>
+          </p:blipFill>
+          <p:spPr>
+            <a:xfrm>
+              <a:off x="2501851" y="1916283"/>
+              <a:ext cx="4539545" cy="3002720"/>
+            </a:xfrm>
+            <a:prstGeom prst="rect">
+              <a:avLst/>
+            </a:prstGeom>
+          </p:spPr>
+        </p:pic>
+        <p:sp>
+          <p:nvSpPr>
+            <p:cNvPr id="5" name="TextBox 4">
+              <a:extLst>
+                <a:ext uri="{FF2B5EF4-FFF2-40B4-BE49-F238E27FC236}">
+                  <a16:creationId xmlns:a16="http://schemas.microsoft.com/office/drawing/2014/main" id="{5832EA6E-72C9-4D45-93C5-BE6489BE895C}"/>
+                </a:ext>
+              </a:extLst>
+            </p:cNvPr>
+            <p:cNvSpPr txBox="1"/>
+            <p:nvPr/>
+          </p:nvSpPr>
+          <p:spPr>
+            <a:xfrm>
+              <a:off x="2314008" y="1514682"/>
+              <a:ext cx="1503070" cy="369332"/>
+            </a:xfrm>
+            <a:prstGeom prst="rect">
+              <a:avLst/>
+            </a:prstGeom>
+            <a:noFill/>
+          </p:spPr>
+          <p:txBody>
+            <a:bodyPr wrap="square" rtlCol="0">
+              <a:spAutoFit/>
+            </a:bodyPr>
+            <a:lstStyle/>
+            <a:p>
+              <a:r>
+                <a:rPr lang="en-US" b="1" dirty="0">
+                  <a:solidFill>
+                    <a:schemeClr val="accent1">
+                      <a:lumMod val="75000"/>
+                    </a:schemeClr>
+                  </a:solidFill>
+                  <a:latin typeface="Yu Gothic UI" panose="020B0500000000000000" pitchFamily="34" charset="-128"/>
+                  <a:ea typeface="Yu Gothic UI" panose="020B0500000000000000" pitchFamily="34" charset="-128"/>
+                </a:rPr>
+                <a:t>site plot</a:t>
+              </a:r>
+            </a:p>
+          </p:txBody>
+        </p:sp>
+        <p:sp>
+          <p:nvSpPr>
+            <p:cNvPr id="6" name="TextBox 5">
+              <a:extLst>
+                <a:ext uri="{FF2B5EF4-FFF2-40B4-BE49-F238E27FC236}">
+                  <a16:creationId xmlns:a16="http://schemas.microsoft.com/office/drawing/2014/main" id="{41E69F9F-2DFC-BA4D-A001-778656E7DCB8}"/>
+                </a:ext>
+              </a:extLst>
+            </p:cNvPr>
+            <p:cNvSpPr txBox="1"/>
+            <p:nvPr/>
+          </p:nvSpPr>
+          <p:spPr>
+            <a:xfrm>
+              <a:off x="2081762" y="1207353"/>
+              <a:ext cx="414428" cy="477054"/>
+            </a:xfrm>
+            <a:prstGeom prst="rect">
+              <a:avLst/>
+            </a:prstGeom>
+            <a:noFill/>
+          </p:spPr>
+          <p:txBody>
+            <a:bodyPr wrap="square" rtlCol="0">
+              <a:spAutoFit/>
+            </a:bodyPr>
+            <a:lstStyle/>
+            <a:p>
+              <a:r>
+                <a:rPr lang="en-US" sz="2500" b="1" dirty="0">
+                  <a:latin typeface="Yu Gothic UI" panose="020B0500000000000000" pitchFamily="34" charset="-128"/>
+                  <a:ea typeface="Yu Gothic UI" panose="020B0500000000000000" pitchFamily="34" charset="-128"/>
+                </a:rPr>
+                <a:t>A</a:t>
+              </a:r>
+            </a:p>
+          </p:txBody>
+        </p:sp>
+        <p:sp>
+          <p:nvSpPr>
+            <p:cNvPr id="7" name="TextBox 6">
+              <a:extLst>
+                <a:ext uri="{FF2B5EF4-FFF2-40B4-BE49-F238E27FC236}">
+                  <a16:creationId xmlns:a16="http://schemas.microsoft.com/office/drawing/2014/main" id="{E821D4A5-89B3-1A40-BCF5-A64562E44EEF}"/>
+                </a:ext>
+              </a:extLst>
+            </p:cNvPr>
+            <p:cNvSpPr txBox="1"/>
+            <p:nvPr/>
+          </p:nvSpPr>
+          <p:spPr>
+            <a:xfrm>
+              <a:off x="7419859" y="1207353"/>
+              <a:ext cx="414428" cy="477054"/>
+            </a:xfrm>
+            <a:prstGeom prst="rect">
+              <a:avLst/>
+            </a:prstGeom>
+            <a:noFill/>
+          </p:spPr>
+          <p:txBody>
+            <a:bodyPr wrap="square" rtlCol="0">
+              <a:spAutoFit/>
+            </a:bodyPr>
+            <a:lstStyle/>
+            <a:p>
+              <a:r>
+                <a:rPr lang="en-US" sz="2500" b="1" dirty="0">
+                  <a:latin typeface="Yu Gothic UI" panose="020B0500000000000000" pitchFamily="34" charset="-128"/>
+                  <a:ea typeface="Yu Gothic UI" panose="020B0500000000000000" pitchFamily="34" charset="-128"/>
+                </a:rPr>
+                <a:t>B</a:t>
+              </a:r>
+            </a:p>
+          </p:txBody>
+        </p:sp>
+        <p:sp>
+          <p:nvSpPr>
+            <p:cNvPr id="8" name="Rectangle 7">
+              <a:extLst>
+                <a:ext uri="{FF2B5EF4-FFF2-40B4-BE49-F238E27FC236}">
+                  <a16:creationId xmlns:a16="http://schemas.microsoft.com/office/drawing/2014/main" id="{A76B313D-8650-CF47-A83C-ED1A70A387E8}"/>
+                </a:ext>
+              </a:extLst>
+            </p:cNvPr>
+            <p:cNvSpPr/>
+            <p:nvPr/>
+          </p:nvSpPr>
+          <p:spPr>
+            <a:xfrm>
+              <a:off x="2445719" y="1884015"/>
+              <a:ext cx="3067575" cy="1908056"/>
+            </a:xfrm>
+            <a:prstGeom prst="rect">
+              <a:avLst/>
+            </a:prstGeom>
+            <a:noFill/>
+            <a:ln w="28575">
+              <a:solidFill>
+                <a:schemeClr val="accent1">
+                  <a:lumMod val="75000"/>
+                </a:schemeClr>
+              </a:solidFill>
+              <a:prstDash val="solid"/>
+            </a:ln>
+          </p:spPr>
+          <p:style>
+            <a:lnRef idx="2">
+              <a:schemeClr val="accent1">
+                <a:shade val="50000"/>
+              </a:schemeClr>
+            </a:lnRef>
+            <a:fillRef idx="1">
+              <a:schemeClr val="accent1"/>
+            </a:fillRef>
+            <a:effectRef idx="0">
+              <a:schemeClr val="accent1"/>
+            </a:effectRef>
+            <a:fontRef idx="minor">
+              <a:schemeClr val="lt1"/>
+            </a:fontRef>
+          </p:style>
+          <p:txBody>
+            <a:bodyPr rtlCol="0" anchor="ctr"/>
+            <a:lstStyle/>
+            <a:p>
+              <a:pPr algn="ctr"/>
+              <a:endParaRPr lang="en-US"/>
+            </a:p>
+          </p:txBody>
+        </p:sp>
+        <p:sp>
+          <p:nvSpPr>
+            <p:cNvPr id="9" name="Rectangle 8">
+              <a:extLst>
+                <a:ext uri="{FF2B5EF4-FFF2-40B4-BE49-F238E27FC236}">
+                  <a16:creationId xmlns:a16="http://schemas.microsoft.com/office/drawing/2014/main" id="{EE4C6525-F8CB-B047-A025-DFDA011BAAA4}"/>
+                </a:ext>
+              </a:extLst>
+            </p:cNvPr>
+            <p:cNvSpPr/>
+            <p:nvPr/>
+          </p:nvSpPr>
+          <p:spPr>
+            <a:xfrm>
+              <a:off x="5538325" y="1884014"/>
+              <a:ext cx="1503071" cy="3112828"/>
+            </a:xfrm>
+            <a:prstGeom prst="rect">
+              <a:avLst/>
+            </a:prstGeom>
+            <a:noFill/>
+            <a:ln w="28575">
+              <a:solidFill>
+                <a:schemeClr val="accent6">
+                  <a:lumMod val="75000"/>
+                </a:schemeClr>
+              </a:solidFill>
+              <a:prstDash val="solid"/>
+            </a:ln>
+          </p:spPr>
+          <p:style>
+            <a:lnRef idx="2">
+              <a:schemeClr val="accent1">
+                <a:shade val="50000"/>
+              </a:schemeClr>
+            </a:lnRef>
+            <a:fillRef idx="1">
+              <a:schemeClr val="accent1"/>
+            </a:fillRef>
+            <a:effectRef idx="0">
+              <a:schemeClr val="accent1"/>
+            </a:effectRef>
+            <a:fontRef idx="minor">
+              <a:schemeClr val="lt1"/>
+            </a:fontRef>
+          </p:style>
+          <p:txBody>
+            <a:bodyPr rtlCol="0" anchor="ctr"/>
+            <a:lstStyle/>
+            <a:p>
+              <a:pPr algn="ctr"/>
+              <a:endParaRPr lang="en-US"/>
+            </a:p>
+          </p:txBody>
+        </p:sp>
+        <p:sp>
+          <p:nvSpPr>
+            <p:cNvPr id="10" name="Rectangle 9">
+              <a:extLst>
+                <a:ext uri="{FF2B5EF4-FFF2-40B4-BE49-F238E27FC236}">
+                  <a16:creationId xmlns:a16="http://schemas.microsoft.com/office/drawing/2014/main" id="{8C9357BC-CC87-A644-AF06-18F9659A0F82}"/>
+                </a:ext>
+              </a:extLst>
+            </p:cNvPr>
+            <p:cNvSpPr/>
+            <p:nvPr/>
+          </p:nvSpPr>
+          <p:spPr>
+            <a:xfrm>
+              <a:off x="2445719" y="3814932"/>
+              <a:ext cx="3067575" cy="1181910"/>
+            </a:xfrm>
+            <a:prstGeom prst="rect">
+              <a:avLst/>
+            </a:prstGeom>
+            <a:noFill/>
+            <a:ln w="28575">
+              <a:solidFill>
+                <a:schemeClr val="accent2">
+                  <a:lumMod val="75000"/>
+                </a:schemeClr>
+              </a:solidFill>
+              <a:prstDash val="solid"/>
+            </a:ln>
+          </p:spPr>
+          <p:style>
+            <a:lnRef idx="2">
+              <a:schemeClr val="accent1">
+                <a:shade val="50000"/>
+              </a:schemeClr>
+            </a:lnRef>
+            <a:fillRef idx="1">
+              <a:schemeClr val="accent1"/>
+            </a:fillRef>
+            <a:effectRef idx="0">
+              <a:schemeClr val="accent1"/>
+            </a:effectRef>
+            <a:fontRef idx="minor">
+              <a:schemeClr val="lt1"/>
+            </a:fontRef>
+          </p:style>
+          <p:txBody>
+            <a:bodyPr rtlCol="0" anchor="ctr"/>
+            <a:lstStyle/>
+            <a:p>
+              <a:pPr algn="ctr"/>
+              <a:endParaRPr lang="en-US"/>
+            </a:p>
+          </p:txBody>
+        </p:sp>
+        <p:sp>
+          <p:nvSpPr>
+            <p:cNvPr id="11" name="TextBox 10">
+              <a:extLst>
+                <a:ext uri="{FF2B5EF4-FFF2-40B4-BE49-F238E27FC236}">
+                  <a16:creationId xmlns:a16="http://schemas.microsoft.com/office/drawing/2014/main" id="{0655E827-B807-5F4E-829F-60713FB7A7B0}"/>
+                </a:ext>
+              </a:extLst>
+            </p:cNvPr>
+            <p:cNvSpPr txBox="1"/>
+            <p:nvPr/>
+          </p:nvSpPr>
+          <p:spPr>
+            <a:xfrm>
+              <a:off x="5513294" y="1514682"/>
+              <a:ext cx="1503070" cy="369332"/>
+            </a:xfrm>
+            <a:prstGeom prst="rect">
+              <a:avLst/>
+            </a:prstGeom>
+            <a:noFill/>
+          </p:spPr>
+          <p:txBody>
+            <a:bodyPr wrap="square" rtlCol="0">
+              <a:spAutoFit/>
+            </a:bodyPr>
+            <a:lstStyle/>
+            <a:p>
+              <a:r>
+                <a:rPr lang="en-US" b="1" dirty="0">
+                  <a:solidFill>
+                    <a:schemeClr val="accent6">
+                      <a:lumMod val="75000"/>
+                    </a:schemeClr>
+                  </a:solidFill>
+                  <a:latin typeface="Yu Gothic UI" panose="020B0500000000000000" pitchFamily="34" charset="-128"/>
+                  <a:ea typeface="Yu Gothic UI" panose="020B0500000000000000" pitchFamily="34" charset="-128"/>
+                </a:rPr>
+                <a:t>protein plot</a:t>
+              </a:r>
+            </a:p>
+          </p:txBody>
+        </p:sp>
+        <p:sp>
+          <p:nvSpPr>
+            <p:cNvPr id="12" name="TextBox 11">
+              <a:extLst>
+                <a:ext uri="{FF2B5EF4-FFF2-40B4-BE49-F238E27FC236}">
+                  <a16:creationId xmlns:a16="http://schemas.microsoft.com/office/drawing/2014/main" id="{5C8E60FA-5A9D-A64E-AC36-D215C0158C19}"/>
+                </a:ext>
+              </a:extLst>
+            </p:cNvPr>
+            <p:cNvSpPr txBox="1"/>
+            <p:nvPr/>
+          </p:nvSpPr>
+          <p:spPr>
+            <a:xfrm>
+              <a:off x="2390208" y="4941717"/>
+              <a:ext cx="1800792" cy="369332"/>
+            </a:xfrm>
+            <a:prstGeom prst="rect">
+              <a:avLst/>
+            </a:prstGeom>
+            <a:noFill/>
+          </p:spPr>
+          <p:txBody>
+            <a:bodyPr wrap="square" rtlCol="0">
+              <a:spAutoFit/>
+            </a:bodyPr>
+            <a:lstStyle/>
+            <a:p>
+              <a:r>
+                <a:rPr lang="en-US" b="1" dirty="0">
+                  <a:solidFill>
+                    <a:schemeClr val="accent2">
+                      <a:lumMod val="75000"/>
+                    </a:schemeClr>
+                  </a:solidFill>
+                  <a:latin typeface="Yu Gothic UI" panose="020B0500000000000000" pitchFamily="34" charset="-128"/>
+                  <a:ea typeface="Yu Gothic UI" panose="020B0500000000000000" pitchFamily="34" charset="-128"/>
+                </a:rPr>
+                <a:t>mutation plot</a:t>
+              </a:r>
+            </a:p>
+          </p:txBody>
+        </p:sp>
+      </p:grpSp>
+    </p:spTree>
+    <p:extLst>
+      <p:ext uri="{BB962C8B-B14F-4D97-AF65-F5344CB8AC3E}">
+        <p14:creationId xmlns:p14="http://schemas.microsoft.com/office/powerpoint/2010/main" val="4261679545"/>
+      </p:ext>
+    </p:extLst>
+  </p:cSld>
+  <p:clrMapOvr>
+    <a:masterClrMapping/>
+  </p:clrMapOvr>
+</p:sld>
+</file>
+
 <file path=ppt/theme/theme1.xml><?xml version="1.0" encoding="utf-8"?>
 <a:theme xmlns:a="http://schemas.openxmlformats.org/drawingml/2006/main" name="Office Theme">
   <a:themeElements>

</xml_diff>

<commit_message>
added white background to the figure
</commit_message>
<xml_diff>
--- a/fig/figs.pptx
+++ b/fig/figs.pptx
@@ -3608,10 +3608,10 @@
       </p:grpSpPr>
       <p:grpSp>
         <p:nvGrpSpPr>
-          <p:cNvPr id="18" name="Group 17">
-            <a:extLst>
-              <a:ext uri="{FF2B5EF4-FFF2-40B4-BE49-F238E27FC236}">
-                <a16:creationId xmlns:a16="http://schemas.microsoft.com/office/drawing/2014/main" id="{EF67AF01-839B-7546-A6C4-E95814637985}"/>
+          <p:cNvPr id="3" name="Group 2">
+            <a:extLst>
+              <a:ext uri="{FF2B5EF4-FFF2-40B4-BE49-F238E27FC236}">
+                <a16:creationId xmlns:a16="http://schemas.microsoft.com/office/drawing/2014/main" id="{C3BFF71F-4BF4-4A4C-8999-442CA217D1F4}"/>
               </a:ext>
             </a:extLst>
           </p:cNvPr>
@@ -3620,18 +3620,70 @@
         </p:nvGrpSpPr>
         <p:grpSpPr>
           <a:xfrm>
-            <a:off x="1436303" y="372317"/>
-            <a:ext cx="5091345" cy="6981163"/>
-            <a:chOff x="1436303" y="-246248"/>
-            <a:chExt cx="5091345" cy="6981163"/>
+            <a:off x="1530433" y="-61582"/>
+            <a:ext cx="5147476" cy="6981163"/>
+            <a:chOff x="1436303" y="372317"/>
+            <a:chExt cx="5147476" cy="6981163"/>
           </a:xfrm>
         </p:grpSpPr>
+        <p:sp>
+          <p:nvSpPr>
+            <p:cNvPr id="2" name="Rectangle 1">
+              <a:extLst>
+                <a:ext uri="{FF2B5EF4-FFF2-40B4-BE49-F238E27FC236}">
+                  <a16:creationId xmlns:a16="http://schemas.microsoft.com/office/drawing/2014/main" id="{157E5B75-5ED8-904B-84B0-776AD98EF7AB}"/>
+                </a:ext>
+              </a:extLst>
+            </p:cNvPr>
+            <p:cNvSpPr/>
+            <p:nvPr/>
+          </p:nvSpPr>
+          <p:spPr>
+            <a:xfrm>
+              <a:off x="1502836" y="427442"/>
+              <a:ext cx="5080943" cy="6926037"/>
+            </a:xfrm>
+            <a:prstGeom prst="rect">
+              <a:avLst/>
+            </a:prstGeom>
+            <a:solidFill>
+              <a:schemeClr val="bg1"/>
+            </a:solidFill>
+            <a:ln>
+              <a:noFill/>
+            </a:ln>
+          </p:spPr>
+          <p:style>
+            <a:lnRef idx="2">
+              <a:schemeClr val="accent1">
+                <a:shade val="50000"/>
+              </a:schemeClr>
+            </a:lnRef>
+            <a:fillRef idx="1">
+              <a:schemeClr val="accent1"/>
+            </a:fillRef>
+            <a:effectRef idx="0">
+              <a:schemeClr val="accent1"/>
+            </a:effectRef>
+            <a:fontRef idx="minor">
+              <a:schemeClr val="lt1"/>
+            </a:fontRef>
+          </p:style>
+          <p:txBody>
+            <a:bodyPr rtlCol="0" anchor="ctr"/>
+            <a:lstStyle/>
+            <a:p>
+              <a:pPr algn="ctr"/>
+              <a:endParaRPr lang="en-US"/>
+            </a:p>
+          </p:txBody>
+        </p:sp>
         <p:grpSp>
           <p:nvGrpSpPr>
-            <p:cNvPr id="14" name="Group 13">
+            <p:cNvPr id="18" name="Group 17">
               <a:extLst>
                 <a:ext uri="{FF2B5EF4-FFF2-40B4-BE49-F238E27FC236}">
-                  <a16:creationId xmlns:a16="http://schemas.microsoft.com/office/drawing/2014/main" id="{7CC70B57-53C7-904B-884E-4A9EE2003FD0}"/>
+                  <a16:creationId xmlns:a16="http://schemas.microsoft.com/office/drawing/2014/main" id="{EF67AF01-839B-7546-A6C4-E95814637985}"/>
                 </a:ext>
               </a:extLst>
             </p:cNvPr>
@@ -3640,145 +3692,18 @@
           </p:nvGrpSpPr>
           <p:grpSpPr>
             <a:xfrm>
-              <a:off x="1579960" y="3476702"/>
-              <a:ext cx="4903502" cy="3258213"/>
-              <a:chOff x="1436303" y="3913916"/>
-              <a:chExt cx="4903502" cy="3258213"/>
+              <a:off x="1436303" y="372317"/>
+              <a:ext cx="5091345" cy="6981163"/>
+              <a:chOff x="1436303" y="-246248"/>
+              <a:chExt cx="5091345" cy="6981163"/>
             </a:xfrm>
           </p:grpSpPr>
-          <p:pic>
-            <p:nvPicPr>
-              <p:cNvPr id="15" name="Picture 14">
+          <p:grpSp>
+            <p:nvGrpSpPr>
+              <p:cNvPr id="14" name="Group 13">
                 <a:extLst>
                   <a:ext uri="{FF2B5EF4-FFF2-40B4-BE49-F238E27FC236}">
-                    <a16:creationId xmlns:a16="http://schemas.microsoft.com/office/drawing/2014/main" id="{F560D8F8-DFE8-AA40-A53D-76026BE99D92}"/>
-                  </a:ext>
-                </a:extLst>
-              </p:cNvPr>
-              <p:cNvPicPr>
-                <a:picLocks noChangeAspect="1"/>
-              </p:cNvPicPr>
-              <p:nvPr/>
-            </p:nvPicPr>
-            <p:blipFill>
-              <a:blip r:embed="rId2"/>
-              <a:stretch>
-                <a:fillRect/>
-              </a:stretch>
-            </p:blipFill>
-            <p:spPr>
-              <a:xfrm>
-                <a:off x="1800260" y="4169409"/>
-                <a:ext cx="4539545" cy="3002720"/>
-              </a:xfrm>
-              <a:prstGeom prst="rect">
-                <a:avLst/>
-              </a:prstGeom>
-            </p:spPr>
-          </p:pic>
-          <p:sp>
-            <p:nvSpPr>
-              <p:cNvPr id="7" name="TextBox 6">
-                <a:extLst>
-                  <a:ext uri="{FF2B5EF4-FFF2-40B4-BE49-F238E27FC236}">
-                    <a16:creationId xmlns:a16="http://schemas.microsoft.com/office/drawing/2014/main" id="{E821D4A5-89B3-1A40-BCF5-A64562E44EEF}"/>
-                  </a:ext>
-                </a:extLst>
-              </p:cNvPr>
-              <p:cNvSpPr txBox="1"/>
-              <p:nvPr/>
-            </p:nvSpPr>
-            <p:spPr>
-              <a:xfrm>
-                <a:off x="1436303" y="3913916"/>
-                <a:ext cx="414428" cy="477054"/>
-              </a:xfrm>
-              <a:prstGeom prst="rect">
-                <a:avLst/>
-              </a:prstGeom>
-              <a:noFill/>
-            </p:spPr>
-            <p:txBody>
-              <a:bodyPr wrap="square" rtlCol="0">
-                <a:spAutoFit/>
-              </a:bodyPr>
-              <a:lstStyle/>
-              <a:p>
-                <a:r>
-                  <a:rPr lang="en-US" sz="2500" b="1" dirty="0">
-                    <a:latin typeface="Yu Gothic UI" panose="020B0500000000000000" pitchFamily="34" charset="-128"/>
-                    <a:ea typeface="Yu Gothic UI" panose="020B0500000000000000" pitchFamily="34" charset="-128"/>
-                  </a:rPr>
-                  <a:t>B</a:t>
-                </a:r>
-              </a:p>
-            </p:txBody>
-          </p:sp>
-        </p:grpSp>
-        <p:grpSp>
-          <p:nvGrpSpPr>
-            <p:cNvPr id="17" name="Group 16">
-              <a:extLst>
-                <a:ext uri="{FF2B5EF4-FFF2-40B4-BE49-F238E27FC236}">
-                  <a16:creationId xmlns:a16="http://schemas.microsoft.com/office/drawing/2014/main" id="{E61E3C60-A576-A146-A1D7-6EAE6F1A72DE}"/>
-                </a:ext>
-              </a:extLst>
-            </p:cNvPr>
-            <p:cNvGrpSpPr/>
-            <p:nvPr/>
-          </p:nvGrpSpPr>
-          <p:grpSpPr>
-            <a:xfrm>
-              <a:off x="1436303" y="-246248"/>
-              <a:ext cx="5091345" cy="3796367"/>
-              <a:chOff x="1436303" y="-246248"/>
-              <a:chExt cx="5091345" cy="3796367"/>
-            </a:xfrm>
-          </p:grpSpPr>
-          <p:sp>
-            <p:nvSpPr>
-              <p:cNvPr id="6" name="TextBox 5">
-                <a:extLst>
-                  <a:ext uri="{FF2B5EF4-FFF2-40B4-BE49-F238E27FC236}">
-                    <a16:creationId xmlns:a16="http://schemas.microsoft.com/office/drawing/2014/main" id="{41E69F9F-2DFC-BA4D-A001-778656E7DCB8}"/>
-                  </a:ext>
-                </a:extLst>
-              </p:cNvPr>
-              <p:cNvSpPr txBox="1"/>
-              <p:nvPr/>
-            </p:nvSpPr>
-            <p:spPr>
-              <a:xfrm>
-                <a:off x="1436303" y="-246248"/>
-                <a:ext cx="414428" cy="477054"/>
-              </a:xfrm>
-              <a:prstGeom prst="rect">
-                <a:avLst/>
-              </a:prstGeom>
-              <a:noFill/>
-            </p:spPr>
-            <p:txBody>
-              <a:bodyPr wrap="square" rtlCol="0">
-                <a:spAutoFit/>
-              </a:bodyPr>
-              <a:lstStyle/>
-              <a:p>
-                <a:r>
-                  <a:rPr lang="en-US" sz="2500" b="1" dirty="0">
-                    <a:latin typeface="Yu Gothic UI" panose="020B0500000000000000" pitchFamily="34" charset="-128"/>
-                    <a:ea typeface="Yu Gothic UI" panose="020B0500000000000000" pitchFamily="34" charset="-128"/>
-                  </a:rPr>
-                  <a:t>A</a:t>
-                </a:r>
-              </a:p>
-            </p:txBody>
-          </p:sp>
-          <p:grpSp>
-            <p:nvGrpSpPr>
-              <p:cNvPr id="13" name="Group 12">
-                <a:extLst>
-                  <a:ext uri="{FF2B5EF4-FFF2-40B4-BE49-F238E27FC236}">
-                    <a16:creationId xmlns:a16="http://schemas.microsoft.com/office/drawing/2014/main" id="{6357CA36-15F0-0147-9E3D-102409CD864E}"/>
+                    <a16:creationId xmlns:a16="http://schemas.microsoft.com/office/drawing/2014/main" id="{7CC70B57-53C7-904B-884E-4A9EE2003FD0}"/>
                   </a:ext>
                 </a:extLst>
               </p:cNvPr>
@@ -3787,18 +3712,18 @@
             </p:nvGrpSpPr>
             <p:grpSpPr>
               <a:xfrm>
-                <a:off x="1800260" y="-246248"/>
-                <a:ext cx="4727388" cy="3796367"/>
-                <a:chOff x="1668549" y="61081"/>
-                <a:chExt cx="4727388" cy="3796367"/>
+                <a:off x="1579960" y="3476702"/>
+                <a:ext cx="4903502" cy="3258213"/>
+                <a:chOff x="1436303" y="3913916"/>
+                <a:chExt cx="4903502" cy="3258213"/>
               </a:xfrm>
             </p:grpSpPr>
             <p:pic>
               <p:nvPicPr>
-                <p:cNvPr id="16" name="Picture 15">
+                <p:cNvPr id="15" name="Picture 14">
                   <a:extLst>
                     <a:ext uri="{FF2B5EF4-FFF2-40B4-BE49-F238E27FC236}">
-                      <a16:creationId xmlns:a16="http://schemas.microsoft.com/office/drawing/2014/main" id="{D78DF4D7-D255-EB46-BB00-D364F49164D4}"/>
+                      <a16:creationId xmlns:a16="http://schemas.microsoft.com/office/drawing/2014/main" id="{F560D8F8-DFE8-AA40-A53D-76026BE99D92}"/>
                     </a:ext>
                   </a:extLst>
                 </p:cNvPr>
@@ -3808,14 +3733,14 @@
                 <p:nvPr/>
               </p:nvPicPr>
               <p:blipFill>
-                <a:blip r:embed="rId3"/>
+                <a:blip r:embed="rId2"/>
                 <a:stretch>
                   <a:fillRect/>
                 </a:stretch>
               </p:blipFill>
               <p:spPr>
                 <a:xfrm>
-                  <a:off x="1856392" y="462682"/>
+                  <a:off x="1800260" y="4169409"/>
                   <a:ext cx="4539545" cy="3002720"/>
                 </a:xfrm>
                 <a:prstGeom prst="rect">
@@ -3825,10 +3750,10 @@
             </p:pic>
             <p:sp>
               <p:nvSpPr>
-                <p:cNvPr id="5" name="TextBox 4">
+                <p:cNvPr id="7" name="TextBox 6">
                   <a:extLst>
                     <a:ext uri="{FF2B5EF4-FFF2-40B4-BE49-F238E27FC236}">
-                      <a16:creationId xmlns:a16="http://schemas.microsoft.com/office/drawing/2014/main" id="{5832EA6E-72C9-4D45-93C5-BE6489BE895C}"/>
+                      <a16:creationId xmlns:a16="http://schemas.microsoft.com/office/drawing/2014/main" id="{E821D4A5-89B3-1A40-BCF5-A64562E44EEF}"/>
                     </a:ext>
                   </a:extLst>
                 </p:cNvPr>
@@ -3837,8 +3762,8 @@
               </p:nvSpPr>
               <p:spPr>
                 <a:xfrm>
-                  <a:off x="1668549" y="61081"/>
-                  <a:ext cx="1503070" cy="369332"/>
+                  <a:off x="1436303" y="3913916"/>
+                  <a:ext cx="414428" cy="477054"/>
                 </a:xfrm>
                 <a:prstGeom prst="rect">
                   <a:avLst/>
@@ -3852,191 +3777,42 @@
                 <a:lstStyle/>
                 <a:p>
                   <a:r>
-                    <a:rPr lang="en-US" b="1" dirty="0">
-                      <a:solidFill>
-                        <a:schemeClr val="accent1">
-                          <a:lumMod val="75000"/>
-                        </a:schemeClr>
-                      </a:solidFill>
+                    <a:rPr lang="en-US" sz="2500" b="1" dirty="0">
                       <a:latin typeface="Yu Gothic UI" panose="020B0500000000000000" pitchFamily="34" charset="-128"/>
                       <a:ea typeface="Yu Gothic UI" panose="020B0500000000000000" pitchFamily="34" charset="-128"/>
                     </a:rPr>
-                    <a:t>site plot</a:t>
+                    <a:t>B</a:t>
                   </a:r>
                 </a:p>
               </p:txBody>
             </p:sp>
+          </p:grpSp>
+          <p:grpSp>
+            <p:nvGrpSpPr>
+              <p:cNvPr id="17" name="Group 16">
+                <a:extLst>
+                  <a:ext uri="{FF2B5EF4-FFF2-40B4-BE49-F238E27FC236}">
+                    <a16:creationId xmlns:a16="http://schemas.microsoft.com/office/drawing/2014/main" id="{E61E3C60-A576-A146-A1D7-6EAE6F1A72DE}"/>
+                  </a:ext>
+                </a:extLst>
+              </p:cNvPr>
+              <p:cNvGrpSpPr/>
+              <p:nvPr/>
+            </p:nvGrpSpPr>
+            <p:grpSpPr>
+              <a:xfrm>
+                <a:off x="1436303" y="-246248"/>
+                <a:ext cx="5091345" cy="3796367"/>
+                <a:chOff x="1436303" y="-246248"/>
+                <a:chExt cx="5091345" cy="3796367"/>
+              </a:xfrm>
+            </p:grpSpPr>
             <p:sp>
               <p:nvSpPr>
-                <p:cNvPr id="8" name="Rectangle 7">
+                <p:cNvPr id="6" name="TextBox 5">
                   <a:extLst>
                     <a:ext uri="{FF2B5EF4-FFF2-40B4-BE49-F238E27FC236}">
-                      <a16:creationId xmlns:a16="http://schemas.microsoft.com/office/drawing/2014/main" id="{A76B313D-8650-CF47-A83C-ED1A70A387E8}"/>
-                    </a:ext>
-                  </a:extLst>
-                </p:cNvPr>
-                <p:cNvSpPr/>
-                <p:nvPr/>
-              </p:nvSpPr>
-              <p:spPr>
-                <a:xfrm>
-                  <a:off x="1800260" y="430414"/>
-                  <a:ext cx="3067575" cy="1908056"/>
-                </a:xfrm>
-                <a:prstGeom prst="rect">
-                  <a:avLst/>
-                </a:prstGeom>
-                <a:noFill/>
-                <a:ln w="28575">
-                  <a:solidFill>
-                    <a:schemeClr val="accent1">
-                      <a:lumMod val="75000"/>
-                    </a:schemeClr>
-                  </a:solidFill>
-                  <a:prstDash val="solid"/>
-                </a:ln>
-              </p:spPr>
-              <p:style>
-                <a:lnRef idx="2">
-                  <a:schemeClr val="accent1">
-                    <a:shade val="50000"/>
-                  </a:schemeClr>
-                </a:lnRef>
-                <a:fillRef idx="1">
-                  <a:schemeClr val="accent1"/>
-                </a:fillRef>
-                <a:effectRef idx="0">
-                  <a:schemeClr val="accent1"/>
-                </a:effectRef>
-                <a:fontRef idx="minor">
-                  <a:schemeClr val="lt1"/>
-                </a:fontRef>
-              </p:style>
-              <p:txBody>
-                <a:bodyPr rtlCol="0" anchor="ctr"/>
-                <a:lstStyle/>
-                <a:p>
-                  <a:pPr algn="ctr"/>
-                  <a:endParaRPr lang="en-US"/>
-                </a:p>
-              </p:txBody>
-            </p:sp>
-            <p:sp>
-              <p:nvSpPr>
-                <p:cNvPr id="9" name="Rectangle 8">
-                  <a:extLst>
-                    <a:ext uri="{FF2B5EF4-FFF2-40B4-BE49-F238E27FC236}">
-                      <a16:creationId xmlns:a16="http://schemas.microsoft.com/office/drawing/2014/main" id="{EE4C6525-F8CB-B047-A025-DFDA011BAAA4}"/>
-                    </a:ext>
-                  </a:extLst>
-                </p:cNvPr>
-                <p:cNvSpPr/>
-                <p:nvPr/>
-              </p:nvSpPr>
-              <p:spPr>
-                <a:xfrm>
-                  <a:off x="4892866" y="430413"/>
-                  <a:ext cx="1503071" cy="3112828"/>
-                </a:xfrm>
-                <a:prstGeom prst="rect">
-                  <a:avLst/>
-                </a:prstGeom>
-                <a:noFill/>
-                <a:ln w="28575">
-                  <a:solidFill>
-                    <a:schemeClr val="accent6">
-                      <a:lumMod val="75000"/>
-                    </a:schemeClr>
-                  </a:solidFill>
-                  <a:prstDash val="solid"/>
-                </a:ln>
-              </p:spPr>
-              <p:style>
-                <a:lnRef idx="2">
-                  <a:schemeClr val="accent1">
-                    <a:shade val="50000"/>
-                  </a:schemeClr>
-                </a:lnRef>
-                <a:fillRef idx="1">
-                  <a:schemeClr val="accent1"/>
-                </a:fillRef>
-                <a:effectRef idx="0">
-                  <a:schemeClr val="accent1"/>
-                </a:effectRef>
-                <a:fontRef idx="minor">
-                  <a:schemeClr val="lt1"/>
-                </a:fontRef>
-              </p:style>
-              <p:txBody>
-                <a:bodyPr rtlCol="0" anchor="ctr"/>
-                <a:lstStyle/>
-                <a:p>
-                  <a:pPr algn="ctr"/>
-                  <a:endParaRPr lang="en-US"/>
-                </a:p>
-              </p:txBody>
-            </p:sp>
-            <p:sp>
-              <p:nvSpPr>
-                <p:cNvPr id="10" name="Rectangle 9">
-                  <a:extLst>
-                    <a:ext uri="{FF2B5EF4-FFF2-40B4-BE49-F238E27FC236}">
-                      <a16:creationId xmlns:a16="http://schemas.microsoft.com/office/drawing/2014/main" id="{8C9357BC-CC87-A644-AF06-18F9659A0F82}"/>
-                    </a:ext>
-                  </a:extLst>
-                </p:cNvPr>
-                <p:cNvSpPr/>
-                <p:nvPr/>
-              </p:nvSpPr>
-              <p:spPr>
-                <a:xfrm>
-                  <a:off x="1800260" y="2361331"/>
-                  <a:ext cx="3067575" cy="1181910"/>
-                </a:xfrm>
-                <a:prstGeom prst="rect">
-                  <a:avLst/>
-                </a:prstGeom>
-                <a:noFill/>
-                <a:ln w="28575">
-                  <a:solidFill>
-                    <a:schemeClr val="accent2">
-                      <a:lumMod val="75000"/>
-                    </a:schemeClr>
-                  </a:solidFill>
-                  <a:prstDash val="solid"/>
-                </a:ln>
-              </p:spPr>
-              <p:style>
-                <a:lnRef idx="2">
-                  <a:schemeClr val="accent1">
-                    <a:shade val="50000"/>
-                  </a:schemeClr>
-                </a:lnRef>
-                <a:fillRef idx="1">
-                  <a:schemeClr val="accent1"/>
-                </a:fillRef>
-                <a:effectRef idx="0">
-                  <a:schemeClr val="accent1"/>
-                </a:effectRef>
-                <a:fontRef idx="minor">
-                  <a:schemeClr val="lt1"/>
-                </a:fontRef>
-              </p:style>
-              <p:txBody>
-                <a:bodyPr rtlCol="0" anchor="ctr"/>
-                <a:lstStyle/>
-                <a:p>
-                  <a:pPr algn="ctr"/>
-                  <a:endParaRPr lang="en-US"/>
-                </a:p>
-              </p:txBody>
-            </p:sp>
-            <p:sp>
-              <p:nvSpPr>
-                <p:cNvPr id="11" name="TextBox 10">
-                  <a:extLst>
-                    <a:ext uri="{FF2B5EF4-FFF2-40B4-BE49-F238E27FC236}">
-                      <a16:creationId xmlns:a16="http://schemas.microsoft.com/office/drawing/2014/main" id="{0655E827-B807-5F4E-829F-60713FB7A7B0}"/>
+                      <a16:creationId xmlns:a16="http://schemas.microsoft.com/office/drawing/2014/main" id="{41E69F9F-2DFC-BA4D-A001-778656E7DCB8}"/>
                     </a:ext>
                   </a:extLst>
                 </p:cNvPr>
@@ -4045,8 +3821,8 @@
               </p:nvSpPr>
               <p:spPr>
                 <a:xfrm>
-                  <a:off x="4867835" y="61081"/>
-                  <a:ext cx="1503070" cy="369332"/>
+                  <a:off x="1436303" y="-246248"/>
+                  <a:ext cx="414428" cy="477054"/>
                 </a:xfrm>
                 <a:prstGeom prst="rect">
                   <a:avLst/>
@@ -4060,63 +3836,360 @@
                 <a:lstStyle/>
                 <a:p>
                   <a:r>
-                    <a:rPr lang="en-US" b="1" dirty="0">
-                      <a:solidFill>
-                        <a:schemeClr val="accent6">
-                          <a:lumMod val="75000"/>
-                        </a:schemeClr>
-                      </a:solidFill>
+                    <a:rPr lang="en-US" sz="2500" b="1" dirty="0">
                       <a:latin typeface="Yu Gothic UI" panose="020B0500000000000000" pitchFamily="34" charset="-128"/>
                       <a:ea typeface="Yu Gothic UI" panose="020B0500000000000000" pitchFamily="34" charset="-128"/>
                     </a:rPr>
-                    <a:t>protein plot</a:t>
+                    <a:t>A</a:t>
                   </a:r>
                 </a:p>
               </p:txBody>
             </p:sp>
-            <p:sp>
-              <p:nvSpPr>
-                <p:cNvPr id="12" name="TextBox 11">
+            <p:grpSp>
+              <p:nvGrpSpPr>
+                <p:cNvPr id="13" name="Group 12">
                   <a:extLst>
                     <a:ext uri="{FF2B5EF4-FFF2-40B4-BE49-F238E27FC236}">
-                      <a16:creationId xmlns:a16="http://schemas.microsoft.com/office/drawing/2014/main" id="{5C8E60FA-5A9D-A64E-AC36-D215C0158C19}"/>
+                      <a16:creationId xmlns:a16="http://schemas.microsoft.com/office/drawing/2014/main" id="{6357CA36-15F0-0147-9E3D-102409CD864E}"/>
                     </a:ext>
                   </a:extLst>
                 </p:cNvPr>
-                <p:cNvSpPr txBox="1"/>
+                <p:cNvGrpSpPr/>
                 <p:nvPr/>
-              </p:nvSpPr>
-              <p:spPr>
+              </p:nvGrpSpPr>
+              <p:grpSpPr>
                 <a:xfrm>
-                  <a:off x="1744749" y="3488116"/>
-                  <a:ext cx="1800792" cy="369332"/>
+                  <a:off x="1800260" y="-246248"/>
+                  <a:ext cx="4727388" cy="3796367"/>
+                  <a:chOff x="1668549" y="61081"/>
+                  <a:chExt cx="4727388" cy="3796367"/>
                 </a:xfrm>
-                <a:prstGeom prst="rect">
-                  <a:avLst/>
-                </a:prstGeom>
-                <a:noFill/>
-              </p:spPr>
-              <p:txBody>
-                <a:bodyPr wrap="square" rtlCol="0">
-                  <a:spAutoFit/>
-                </a:bodyPr>
-                <a:lstStyle/>
-                <a:p>
-                  <a:r>
-                    <a:rPr lang="en-US" b="1" dirty="0">
-                      <a:solidFill>
-                        <a:schemeClr val="accent2">
-                          <a:lumMod val="75000"/>
-                        </a:schemeClr>
-                      </a:solidFill>
-                      <a:latin typeface="Yu Gothic UI" panose="020B0500000000000000" pitchFamily="34" charset="-128"/>
-                      <a:ea typeface="Yu Gothic UI" panose="020B0500000000000000" pitchFamily="34" charset="-128"/>
-                    </a:rPr>
-                    <a:t>mutation plot</a:t>
-                  </a:r>
-                </a:p>
-              </p:txBody>
-            </p:sp>
+              </p:grpSpPr>
+              <p:pic>
+                <p:nvPicPr>
+                  <p:cNvPr id="16" name="Picture 15">
+                    <a:extLst>
+                      <a:ext uri="{FF2B5EF4-FFF2-40B4-BE49-F238E27FC236}">
+                        <a16:creationId xmlns:a16="http://schemas.microsoft.com/office/drawing/2014/main" id="{D78DF4D7-D255-EB46-BB00-D364F49164D4}"/>
+                      </a:ext>
+                    </a:extLst>
+                  </p:cNvPr>
+                  <p:cNvPicPr>
+                    <a:picLocks noChangeAspect="1"/>
+                  </p:cNvPicPr>
+                  <p:nvPr/>
+                </p:nvPicPr>
+                <p:blipFill>
+                  <a:blip r:embed="rId3"/>
+                  <a:stretch>
+                    <a:fillRect/>
+                  </a:stretch>
+                </p:blipFill>
+                <p:spPr>
+                  <a:xfrm>
+                    <a:off x="1856392" y="462682"/>
+                    <a:ext cx="4539545" cy="3002720"/>
+                  </a:xfrm>
+                  <a:prstGeom prst="rect">
+                    <a:avLst/>
+                  </a:prstGeom>
+                </p:spPr>
+              </p:pic>
+              <p:sp>
+                <p:nvSpPr>
+                  <p:cNvPr id="5" name="TextBox 4">
+                    <a:extLst>
+                      <a:ext uri="{FF2B5EF4-FFF2-40B4-BE49-F238E27FC236}">
+                        <a16:creationId xmlns:a16="http://schemas.microsoft.com/office/drawing/2014/main" id="{5832EA6E-72C9-4D45-93C5-BE6489BE895C}"/>
+                      </a:ext>
+                    </a:extLst>
+                  </p:cNvPr>
+                  <p:cNvSpPr txBox="1"/>
+                  <p:nvPr/>
+                </p:nvSpPr>
+                <p:spPr>
+                  <a:xfrm>
+                    <a:off x="1668549" y="61081"/>
+                    <a:ext cx="1503070" cy="369332"/>
+                  </a:xfrm>
+                  <a:prstGeom prst="rect">
+                    <a:avLst/>
+                  </a:prstGeom>
+                  <a:noFill/>
+                </p:spPr>
+                <p:txBody>
+                  <a:bodyPr wrap="square" rtlCol="0">
+                    <a:spAutoFit/>
+                  </a:bodyPr>
+                  <a:lstStyle/>
+                  <a:p>
+                    <a:r>
+                      <a:rPr lang="en-US" b="1" dirty="0">
+                        <a:solidFill>
+                          <a:schemeClr val="accent1">
+                            <a:lumMod val="75000"/>
+                          </a:schemeClr>
+                        </a:solidFill>
+                        <a:latin typeface="Yu Gothic UI" panose="020B0500000000000000" pitchFamily="34" charset="-128"/>
+                        <a:ea typeface="Yu Gothic UI" panose="020B0500000000000000" pitchFamily="34" charset="-128"/>
+                      </a:rPr>
+                      <a:t>site plot</a:t>
+                    </a:r>
+                  </a:p>
+                </p:txBody>
+              </p:sp>
+              <p:sp>
+                <p:nvSpPr>
+                  <p:cNvPr id="8" name="Rectangle 7">
+                    <a:extLst>
+                      <a:ext uri="{FF2B5EF4-FFF2-40B4-BE49-F238E27FC236}">
+                        <a16:creationId xmlns:a16="http://schemas.microsoft.com/office/drawing/2014/main" id="{A76B313D-8650-CF47-A83C-ED1A70A387E8}"/>
+                      </a:ext>
+                    </a:extLst>
+                  </p:cNvPr>
+                  <p:cNvSpPr/>
+                  <p:nvPr/>
+                </p:nvSpPr>
+                <p:spPr>
+                  <a:xfrm>
+                    <a:off x="1800260" y="430414"/>
+                    <a:ext cx="3067575" cy="1908056"/>
+                  </a:xfrm>
+                  <a:prstGeom prst="rect">
+                    <a:avLst/>
+                  </a:prstGeom>
+                  <a:noFill/>
+                  <a:ln w="28575">
+                    <a:solidFill>
+                      <a:schemeClr val="accent1">
+                        <a:lumMod val="75000"/>
+                      </a:schemeClr>
+                    </a:solidFill>
+                    <a:prstDash val="solid"/>
+                  </a:ln>
+                </p:spPr>
+                <p:style>
+                  <a:lnRef idx="2">
+                    <a:schemeClr val="accent1">
+                      <a:shade val="50000"/>
+                    </a:schemeClr>
+                  </a:lnRef>
+                  <a:fillRef idx="1">
+                    <a:schemeClr val="accent1"/>
+                  </a:fillRef>
+                  <a:effectRef idx="0">
+                    <a:schemeClr val="accent1"/>
+                  </a:effectRef>
+                  <a:fontRef idx="minor">
+                    <a:schemeClr val="lt1"/>
+                  </a:fontRef>
+                </p:style>
+                <p:txBody>
+                  <a:bodyPr rtlCol="0" anchor="ctr"/>
+                  <a:lstStyle/>
+                  <a:p>
+                    <a:pPr algn="ctr"/>
+                    <a:endParaRPr lang="en-US"/>
+                  </a:p>
+                </p:txBody>
+              </p:sp>
+              <p:sp>
+                <p:nvSpPr>
+                  <p:cNvPr id="9" name="Rectangle 8">
+                    <a:extLst>
+                      <a:ext uri="{FF2B5EF4-FFF2-40B4-BE49-F238E27FC236}">
+                        <a16:creationId xmlns:a16="http://schemas.microsoft.com/office/drawing/2014/main" id="{EE4C6525-F8CB-B047-A025-DFDA011BAAA4}"/>
+                      </a:ext>
+                    </a:extLst>
+                  </p:cNvPr>
+                  <p:cNvSpPr/>
+                  <p:nvPr/>
+                </p:nvSpPr>
+                <p:spPr>
+                  <a:xfrm>
+                    <a:off x="4892866" y="430413"/>
+                    <a:ext cx="1503071" cy="3112828"/>
+                  </a:xfrm>
+                  <a:prstGeom prst="rect">
+                    <a:avLst/>
+                  </a:prstGeom>
+                  <a:noFill/>
+                  <a:ln w="28575">
+                    <a:solidFill>
+                      <a:schemeClr val="accent6">
+                        <a:lumMod val="75000"/>
+                      </a:schemeClr>
+                    </a:solidFill>
+                    <a:prstDash val="solid"/>
+                  </a:ln>
+                </p:spPr>
+                <p:style>
+                  <a:lnRef idx="2">
+                    <a:schemeClr val="accent1">
+                      <a:shade val="50000"/>
+                    </a:schemeClr>
+                  </a:lnRef>
+                  <a:fillRef idx="1">
+                    <a:schemeClr val="accent1"/>
+                  </a:fillRef>
+                  <a:effectRef idx="0">
+                    <a:schemeClr val="accent1"/>
+                  </a:effectRef>
+                  <a:fontRef idx="minor">
+                    <a:schemeClr val="lt1"/>
+                  </a:fontRef>
+                </p:style>
+                <p:txBody>
+                  <a:bodyPr rtlCol="0" anchor="ctr"/>
+                  <a:lstStyle/>
+                  <a:p>
+                    <a:pPr algn="ctr"/>
+                    <a:endParaRPr lang="en-US"/>
+                  </a:p>
+                </p:txBody>
+              </p:sp>
+              <p:sp>
+                <p:nvSpPr>
+                  <p:cNvPr id="10" name="Rectangle 9">
+                    <a:extLst>
+                      <a:ext uri="{FF2B5EF4-FFF2-40B4-BE49-F238E27FC236}">
+                        <a16:creationId xmlns:a16="http://schemas.microsoft.com/office/drawing/2014/main" id="{8C9357BC-CC87-A644-AF06-18F9659A0F82}"/>
+                      </a:ext>
+                    </a:extLst>
+                  </p:cNvPr>
+                  <p:cNvSpPr/>
+                  <p:nvPr/>
+                </p:nvSpPr>
+                <p:spPr>
+                  <a:xfrm>
+                    <a:off x="1800260" y="2361331"/>
+                    <a:ext cx="3067575" cy="1181910"/>
+                  </a:xfrm>
+                  <a:prstGeom prst="rect">
+                    <a:avLst/>
+                  </a:prstGeom>
+                  <a:noFill/>
+                  <a:ln w="28575">
+                    <a:solidFill>
+                      <a:schemeClr val="accent2">
+                        <a:lumMod val="75000"/>
+                      </a:schemeClr>
+                    </a:solidFill>
+                    <a:prstDash val="solid"/>
+                  </a:ln>
+                </p:spPr>
+                <p:style>
+                  <a:lnRef idx="2">
+                    <a:schemeClr val="accent1">
+                      <a:shade val="50000"/>
+                    </a:schemeClr>
+                  </a:lnRef>
+                  <a:fillRef idx="1">
+                    <a:schemeClr val="accent1"/>
+                  </a:fillRef>
+                  <a:effectRef idx="0">
+                    <a:schemeClr val="accent1"/>
+                  </a:effectRef>
+                  <a:fontRef idx="minor">
+                    <a:schemeClr val="lt1"/>
+                  </a:fontRef>
+                </p:style>
+                <p:txBody>
+                  <a:bodyPr rtlCol="0" anchor="ctr"/>
+                  <a:lstStyle/>
+                  <a:p>
+                    <a:pPr algn="ctr"/>
+                    <a:endParaRPr lang="en-US"/>
+                  </a:p>
+                </p:txBody>
+              </p:sp>
+              <p:sp>
+                <p:nvSpPr>
+                  <p:cNvPr id="11" name="TextBox 10">
+                    <a:extLst>
+                      <a:ext uri="{FF2B5EF4-FFF2-40B4-BE49-F238E27FC236}">
+                        <a16:creationId xmlns:a16="http://schemas.microsoft.com/office/drawing/2014/main" id="{0655E827-B807-5F4E-829F-60713FB7A7B0}"/>
+                      </a:ext>
+                    </a:extLst>
+                  </p:cNvPr>
+                  <p:cNvSpPr txBox="1"/>
+                  <p:nvPr/>
+                </p:nvSpPr>
+                <p:spPr>
+                  <a:xfrm>
+                    <a:off x="4867835" y="61081"/>
+                    <a:ext cx="1503070" cy="369332"/>
+                  </a:xfrm>
+                  <a:prstGeom prst="rect">
+                    <a:avLst/>
+                  </a:prstGeom>
+                  <a:noFill/>
+                </p:spPr>
+                <p:txBody>
+                  <a:bodyPr wrap="square" rtlCol="0">
+                    <a:spAutoFit/>
+                  </a:bodyPr>
+                  <a:lstStyle/>
+                  <a:p>
+                    <a:r>
+                      <a:rPr lang="en-US" b="1" dirty="0">
+                        <a:solidFill>
+                          <a:schemeClr val="accent6">
+                            <a:lumMod val="75000"/>
+                          </a:schemeClr>
+                        </a:solidFill>
+                        <a:latin typeface="Yu Gothic UI" panose="020B0500000000000000" pitchFamily="34" charset="-128"/>
+                        <a:ea typeface="Yu Gothic UI" panose="020B0500000000000000" pitchFamily="34" charset="-128"/>
+                      </a:rPr>
+                      <a:t>protein plot</a:t>
+                    </a:r>
+                  </a:p>
+                </p:txBody>
+              </p:sp>
+              <p:sp>
+                <p:nvSpPr>
+                  <p:cNvPr id="12" name="TextBox 11">
+                    <a:extLst>
+                      <a:ext uri="{FF2B5EF4-FFF2-40B4-BE49-F238E27FC236}">
+                        <a16:creationId xmlns:a16="http://schemas.microsoft.com/office/drawing/2014/main" id="{5C8E60FA-5A9D-A64E-AC36-D215C0158C19}"/>
+                      </a:ext>
+                    </a:extLst>
+                  </p:cNvPr>
+                  <p:cNvSpPr txBox="1"/>
+                  <p:nvPr/>
+                </p:nvSpPr>
+                <p:spPr>
+                  <a:xfrm>
+                    <a:off x="1744749" y="3488116"/>
+                    <a:ext cx="1800792" cy="369332"/>
+                  </a:xfrm>
+                  <a:prstGeom prst="rect">
+                    <a:avLst/>
+                  </a:prstGeom>
+                  <a:noFill/>
+                </p:spPr>
+                <p:txBody>
+                  <a:bodyPr wrap="square" rtlCol="0">
+                    <a:spAutoFit/>
+                  </a:bodyPr>
+                  <a:lstStyle/>
+                  <a:p>
+                    <a:r>
+                      <a:rPr lang="en-US" b="1" dirty="0">
+                        <a:solidFill>
+                          <a:schemeClr val="accent2">
+                            <a:lumMod val="75000"/>
+                          </a:schemeClr>
+                        </a:solidFill>
+                        <a:latin typeface="Yu Gothic UI" panose="020B0500000000000000" pitchFamily="34" charset="-128"/>
+                        <a:ea typeface="Yu Gothic UI" panose="020B0500000000000000" pitchFamily="34" charset="-128"/>
+                      </a:rPr>
+                      <a:t>mutation plot</a:t>
+                    </a:r>
+                  </a:p>
+                </p:txBody>
+              </p:sp>
+            </p:grpSp>
           </p:grpSp>
         </p:grpSp>
       </p:grpSp>

</xml_diff>